<commit_message>
Added comments and changes to report and presentation for IMDb project
</commit_message>
<xml_diff>
--- a/6_Documentation/IMDb_Classification_Presentation.pptx
+++ b/6_Documentation/IMDb_Classification_Presentation.pptx
@@ -206,7 +206,7 @@
           <a:p>
             <a:fld id="{AA74E6DA-C916-4BCE-A101-0DC09126B470}" type="datetimeFigureOut">
               <a:rPr lang="en-US" smtClean="0"/>
-              <a:t>4/10/2024</a:t>
+              <a:t>4/12/2024</a:t>
             </a:fld>
             <a:endParaRPr lang="en-US"/>
           </a:p>
@@ -519,7 +519,7 @@
           <a:p>
             <a:r>
               <a:rPr lang="en-US" dirty="0"/>
-              <a:t>After spending the last 4 months designing and developing the model, the best performer as according to the data gathered from IMDb was a model performing with a f1_score of 0.25 and the best ROC AUC value of 0.508 meaning slightly above the base of 50/50 random guessing for each genre. Understandably not very high confidence in the model thus far, but I see where this model can improve so we can get a better working model before production. Some steps I see are enlarging our sample size, having more computational resources to perform a 5-fold cross validation instead of a 3-fold as well as to tune the different layers of the model to be more </a:t>
+              <a:t>After spending the last 4 months designing and developing the model, the best performer as according to the data gathered from IMDb was a model performing with a f1_score of 0.25 based on test or unseen data and the best ROC AUC value of 0.508 meaning slightly above the base of 50/50 random guessing for each genre. Understandably not very high confidence in the model thus far, but I see where this model can improve so we can get a better working model before production. Some steps I see are enlarging our sample size, having more computational resources to perform a 5-fold cross validation instead of a 3-fold as well as to tune the different layers of the model to be more </a:t>
             </a:r>
             <a:r>
               <a:rPr lang="en-US" dirty="0" err="1"/>
@@ -567,6 +567,346 @@
     <p:extLst>
       <p:ext uri="{BB962C8B-B14F-4D97-AF65-F5344CB8AC3E}">
         <p14:creationId xmlns:p14="http://schemas.microsoft.com/office/powerpoint/2010/main" val="1801302134"/>
+      </p:ext>
+    </p:extLst>
+  </p:cSld>
+  <p:clrMapOvr>
+    <a:masterClrMapping/>
+  </p:clrMapOvr>
+</p:notes>
+</file>
+
+<file path=ppt/notesSlides/notesSlide2.xml><?xml version="1.0" encoding="utf-8"?>
+<p:notes xmlns:a="http://schemas.openxmlformats.org/drawingml/2006/main" xmlns:r="http://schemas.openxmlformats.org/officeDocument/2006/relationships" xmlns:p="http://schemas.openxmlformats.org/presentationml/2006/main">
+  <p:cSld>
+    <p:spTree>
+      <p:nvGrpSpPr>
+        <p:cNvPr id="1" name=""/>
+        <p:cNvGrpSpPr/>
+        <p:nvPr/>
+      </p:nvGrpSpPr>
+      <p:grpSpPr>
+        <a:xfrm>
+          <a:off x="0" y="0"/>
+          <a:ext cx="0" cy="0"/>
+          <a:chOff x="0" y="0"/>
+          <a:chExt cx="0" cy="0"/>
+        </a:xfrm>
+      </p:grpSpPr>
+      <p:sp>
+        <p:nvSpPr>
+          <p:cNvPr id="2" name="Slide Image Placeholder 1"/>
+          <p:cNvSpPr>
+            <a:spLocks noGrp="1" noRot="1" noChangeAspect="1"/>
+          </p:cNvSpPr>
+          <p:nvPr>
+            <p:ph type="sldImg"/>
+          </p:nvPr>
+        </p:nvSpPr>
+        <p:spPr/>
+      </p:sp>
+      <p:sp>
+        <p:nvSpPr>
+          <p:cNvPr id="3" name="Notes Placeholder 2"/>
+          <p:cNvSpPr>
+            <a:spLocks noGrp="1"/>
+          </p:cNvSpPr>
+          <p:nvPr>
+            <p:ph type="body" idx="1"/>
+          </p:nvPr>
+        </p:nvSpPr>
+        <p:spPr/>
+        <p:txBody>
+          <a:bodyPr/>
+          <a:lstStyle/>
+          <a:p>
+            <a:r>
+              <a:rPr lang="en-US" dirty="0"/>
+              <a:t>For sake of model building, since the order of what Genre the movie is categorized does not matter, I then transformed the dataset to just be a sparse one-hot encoded dataset where each of the genres were different columns and removed ‘None’ aspect since after receiving some advice saw that this might confuse the model</a:t>
+            </a:r>
+          </a:p>
+        </p:txBody>
+      </p:sp>
+      <p:sp>
+        <p:nvSpPr>
+          <p:cNvPr id="4" name="Slide Number Placeholder 3"/>
+          <p:cNvSpPr>
+            <a:spLocks noGrp="1"/>
+          </p:cNvSpPr>
+          <p:nvPr>
+            <p:ph type="sldNum" sz="quarter" idx="5"/>
+          </p:nvPr>
+        </p:nvSpPr>
+        <p:spPr/>
+        <p:txBody>
+          <a:bodyPr/>
+          <a:lstStyle/>
+          <a:p>
+            <a:fld id="{97244C77-9356-4064-841D-90AAE32C5C15}" type="slidenum">
+              <a:rPr lang="en-US" smtClean="0"/>
+              <a:t>4</a:t>
+            </a:fld>
+            <a:endParaRPr lang="en-US"/>
+          </a:p>
+        </p:txBody>
+      </p:sp>
+    </p:spTree>
+    <p:extLst>
+      <p:ext uri="{BB962C8B-B14F-4D97-AF65-F5344CB8AC3E}">
+        <p14:creationId xmlns:p14="http://schemas.microsoft.com/office/powerpoint/2010/main" val="2075149659"/>
+      </p:ext>
+    </p:extLst>
+  </p:cSld>
+  <p:clrMapOvr>
+    <a:masterClrMapping/>
+  </p:clrMapOvr>
+</p:notes>
+</file>
+
+<file path=ppt/notesSlides/notesSlide3.xml><?xml version="1.0" encoding="utf-8"?>
+<p:notes xmlns:a="http://schemas.openxmlformats.org/drawingml/2006/main" xmlns:r="http://schemas.openxmlformats.org/officeDocument/2006/relationships" xmlns:p="http://schemas.openxmlformats.org/presentationml/2006/main">
+  <p:cSld>
+    <p:spTree>
+      <p:nvGrpSpPr>
+        <p:cNvPr id="1" name=""/>
+        <p:cNvGrpSpPr/>
+        <p:nvPr/>
+      </p:nvGrpSpPr>
+      <p:grpSpPr>
+        <a:xfrm>
+          <a:off x="0" y="0"/>
+          <a:ext cx="0" cy="0"/>
+          <a:chOff x="0" y="0"/>
+          <a:chExt cx="0" cy="0"/>
+        </a:xfrm>
+      </p:grpSpPr>
+      <p:sp>
+        <p:nvSpPr>
+          <p:cNvPr id="2" name="Slide Image Placeholder 1"/>
+          <p:cNvSpPr>
+            <a:spLocks noGrp="1" noRot="1" noChangeAspect="1"/>
+          </p:cNvSpPr>
+          <p:nvPr>
+            <p:ph type="sldImg"/>
+          </p:nvPr>
+        </p:nvSpPr>
+        <p:spPr/>
+      </p:sp>
+      <p:sp>
+        <p:nvSpPr>
+          <p:cNvPr id="3" name="Notes Placeholder 2"/>
+          <p:cNvSpPr>
+            <a:spLocks noGrp="1"/>
+          </p:cNvSpPr>
+          <p:nvPr>
+            <p:ph type="body" idx="1"/>
+          </p:nvPr>
+        </p:nvSpPr>
+        <p:spPr/>
+        <p:txBody>
+          <a:bodyPr/>
+          <a:lstStyle/>
+          <a:p>
+            <a:r>
+              <a:rPr lang="en-US" dirty="0"/>
+              <a:t>Depending on </a:t>
+            </a:r>
+            <a:r>
+              <a:rPr lang="en-US" dirty="0" err="1"/>
+              <a:t>acitivaiton</a:t>
+            </a:r>
+            <a:r>
+              <a:rPr lang="en-US" dirty="0"/>
+              <a:t> functions affect how the model classifies or generates an output to each subsequent layer</a:t>
+            </a:r>
+          </a:p>
+          <a:p>
+            <a:r>
+              <a:rPr lang="en-US" dirty="0"/>
+              <a:t>CNNS key for </a:t>
+            </a:r>
+            <a:r>
+              <a:rPr lang="en-US" dirty="0" err="1"/>
+              <a:t>gridlike</a:t>
+            </a:r>
+            <a:r>
+              <a:rPr lang="en-US" dirty="0"/>
+              <a:t> data such as images to learn features of different aspects of the grid, learning </a:t>
+            </a:r>
+            <a:r>
+              <a:rPr lang="en-US" dirty="0" err="1"/>
+              <a:t>hiercarchial</a:t>
+            </a:r>
+            <a:r>
+              <a:rPr lang="en-US" dirty="0"/>
+              <a:t> representation of features of input data</a:t>
+            </a:r>
+          </a:p>
+          <a:p>
+            <a:r>
+              <a:rPr lang="en-US" dirty="0"/>
+              <a:t>Flatten then add dense layers to start making classification for the images of the data (added other dense layers to continue </a:t>
+            </a:r>
+            <a:r>
+              <a:rPr lang="en-US" dirty="0" err="1"/>
+              <a:t>leaerning</a:t>
+            </a:r>
+            <a:r>
+              <a:rPr lang="en-US" dirty="0"/>
+              <a:t> the features of the data once flattened)</a:t>
+            </a:r>
+          </a:p>
+          <a:p>
+            <a:r>
+              <a:rPr lang="en-US" dirty="0"/>
+              <a:t>Configure the learning process before training (compiling), optimizer(function to update parameters of weights of model in training to minimize loss </a:t>
+            </a:r>
+            <a:r>
+              <a:rPr lang="en-US" dirty="0" err="1"/>
+              <a:t>funciton</a:t>
+            </a:r>
+            <a:r>
+              <a:rPr lang="en-US" dirty="0"/>
+              <a:t>), loss(loss functions being used), metrics(evaluate performance of model during </a:t>
+            </a:r>
+            <a:r>
+              <a:rPr lang="en-US" dirty="0" err="1"/>
+              <a:t>trnaing</a:t>
+            </a:r>
+            <a:r>
+              <a:rPr lang="en-US" dirty="0"/>
+              <a:t>), different activation functions affect how the model learns, </a:t>
+            </a:r>
+            <a:r>
+              <a:rPr lang="en-US" dirty="0" err="1"/>
+              <a:t>optimiaer</a:t>
+            </a:r>
+            <a:r>
+              <a:rPr lang="en-US" dirty="0"/>
+              <a:t> min loss so that the model can make accurate predictions on unseen data to match true labels</a:t>
+            </a:r>
+          </a:p>
+        </p:txBody>
+      </p:sp>
+      <p:sp>
+        <p:nvSpPr>
+          <p:cNvPr id="4" name="Slide Number Placeholder 3"/>
+          <p:cNvSpPr>
+            <a:spLocks noGrp="1"/>
+          </p:cNvSpPr>
+          <p:nvPr>
+            <p:ph type="sldNum" sz="quarter" idx="5"/>
+          </p:nvPr>
+        </p:nvSpPr>
+        <p:spPr/>
+        <p:txBody>
+          <a:bodyPr/>
+          <a:lstStyle/>
+          <a:p>
+            <a:fld id="{97244C77-9356-4064-841D-90AAE32C5C15}" type="slidenum">
+              <a:rPr lang="en-US" smtClean="0"/>
+              <a:t>5</a:t>
+            </a:fld>
+            <a:endParaRPr lang="en-US"/>
+          </a:p>
+        </p:txBody>
+      </p:sp>
+    </p:spTree>
+    <p:extLst>
+      <p:ext uri="{BB962C8B-B14F-4D97-AF65-F5344CB8AC3E}">
+        <p14:creationId xmlns:p14="http://schemas.microsoft.com/office/powerpoint/2010/main" val="3044733792"/>
+      </p:ext>
+    </p:extLst>
+  </p:cSld>
+  <p:clrMapOvr>
+    <a:masterClrMapping/>
+  </p:clrMapOvr>
+</p:notes>
+</file>
+
+<file path=ppt/notesSlides/notesSlide4.xml><?xml version="1.0" encoding="utf-8"?>
+<p:notes xmlns:a="http://schemas.openxmlformats.org/drawingml/2006/main" xmlns:r="http://schemas.openxmlformats.org/officeDocument/2006/relationships" xmlns:p="http://schemas.openxmlformats.org/presentationml/2006/main">
+  <p:cSld>
+    <p:spTree>
+      <p:nvGrpSpPr>
+        <p:cNvPr id="1" name=""/>
+        <p:cNvGrpSpPr/>
+        <p:nvPr/>
+      </p:nvGrpSpPr>
+      <p:grpSpPr>
+        <a:xfrm>
+          <a:off x="0" y="0"/>
+          <a:ext cx="0" cy="0"/>
+          <a:chOff x="0" y="0"/>
+          <a:chExt cx="0" cy="0"/>
+        </a:xfrm>
+      </p:grpSpPr>
+      <p:sp>
+        <p:nvSpPr>
+          <p:cNvPr id="2" name="Slide Image Placeholder 1"/>
+          <p:cNvSpPr>
+            <a:spLocks noGrp="1" noRot="1" noChangeAspect="1"/>
+          </p:cNvSpPr>
+          <p:nvPr>
+            <p:ph type="sldImg"/>
+          </p:nvPr>
+        </p:nvSpPr>
+        <p:spPr/>
+      </p:sp>
+      <p:sp>
+        <p:nvSpPr>
+          <p:cNvPr id="3" name="Notes Placeholder 2"/>
+          <p:cNvSpPr>
+            <a:spLocks noGrp="1"/>
+          </p:cNvSpPr>
+          <p:nvPr>
+            <p:ph type="body" idx="1"/>
+          </p:nvPr>
+        </p:nvSpPr>
+        <p:spPr/>
+        <p:txBody>
+          <a:bodyPr/>
+          <a:lstStyle/>
+          <a:p>
+            <a:r>
+              <a:rPr lang="en-US" dirty="0"/>
+              <a:t>Different activation functions affect how the model classifies the data. A model optimizer provides functions that minimize the loss function during training of the model by adjusting the parameters during </a:t>
+            </a:r>
+            <a:r>
+              <a:rPr lang="en-US" dirty="0" err="1"/>
+              <a:t>trainig</a:t>
+            </a:r>
+            <a:endParaRPr lang="en-US" dirty="0"/>
+          </a:p>
+        </p:txBody>
+      </p:sp>
+      <p:sp>
+        <p:nvSpPr>
+          <p:cNvPr id="4" name="Slide Number Placeholder 3"/>
+          <p:cNvSpPr>
+            <a:spLocks noGrp="1"/>
+          </p:cNvSpPr>
+          <p:nvPr>
+            <p:ph type="sldNum" sz="quarter" idx="5"/>
+          </p:nvPr>
+        </p:nvSpPr>
+        <p:spPr/>
+        <p:txBody>
+          <a:bodyPr/>
+          <a:lstStyle/>
+          <a:p>
+            <a:fld id="{97244C77-9356-4064-841D-90AAE32C5C15}" type="slidenum">
+              <a:rPr lang="en-US" smtClean="0"/>
+              <a:t>6</a:t>
+            </a:fld>
+            <a:endParaRPr lang="en-US"/>
+          </a:p>
+        </p:txBody>
+      </p:sp>
+    </p:spTree>
+    <p:extLst>
+      <p:ext uri="{BB962C8B-B14F-4D97-AF65-F5344CB8AC3E}">
+        <p14:creationId xmlns:p14="http://schemas.microsoft.com/office/powerpoint/2010/main" val="3963660766"/>
       </p:ext>
     </p:extLst>
   </p:cSld>
@@ -802,7 +1142,7 @@
           <a:p>
             <a:fld id="{4E9B4F57-B96C-436C-8E07-9ED15F333B94}" type="datetime1">
               <a:rPr lang="en-US" smtClean="0"/>
-              <a:t>4/10/2024</a:t>
+              <a:t>4/12/2024</a:t>
             </a:fld>
             <a:endParaRPr lang="en-US"/>
           </a:p>
@@ -1015,7 +1355,7 @@
           <a:p>
             <a:fld id="{E6CAFC69-17B8-49ED-8515-EEF742D798A3}" type="datetime1">
               <a:rPr lang="en-US" smtClean="0"/>
-              <a:t>4/10/2024</a:t>
+              <a:t>4/12/2024</a:t>
             </a:fld>
             <a:endParaRPr lang="en-US"/>
           </a:p>
@@ -1271,7 +1611,7 @@
           <a:p>
             <a:fld id="{49BD7017-5031-4A82-AAE7-53B05001D0CF}" type="datetime1">
               <a:rPr lang="en-US" smtClean="0"/>
-              <a:t>4/10/2024</a:t>
+              <a:t>4/12/2024</a:t>
             </a:fld>
             <a:endParaRPr lang="en-US"/>
           </a:p>
@@ -1441,7 +1781,7 @@
           <a:p>
             <a:fld id="{A9A38264-5CCD-493A-9147-46264A34D417}" type="datetime1">
               <a:rPr lang="en-US" smtClean="0"/>
-              <a:t>4/10/2024</a:t>
+              <a:t>4/12/2024</a:t>
             </a:fld>
             <a:endParaRPr lang="en-US"/>
           </a:p>
@@ -1784,7 +2124,7 @@
           <a:p>
             <a:fld id="{3F88EA74-F8A1-44F3-A943-871AE16A7C78}" type="datetime1">
               <a:rPr lang="en-US" smtClean="0"/>
-              <a:t>4/10/2024</a:t>
+              <a:t>4/12/2024</a:t>
             </a:fld>
             <a:endParaRPr lang="en-US"/>
           </a:p>
@@ -2059,7 +2399,7 @@
           <a:p>
             <a:fld id="{5EDD1233-B103-4F41-B1CD-BA0EAAAA00DE}" type="datetime1">
               <a:rPr lang="en-US" smtClean="0"/>
-              <a:t>4/10/2024</a:t>
+              <a:t>4/12/2024</a:t>
             </a:fld>
             <a:endParaRPr lang="en-US"/>
           </a:p>
@@ -2438,7 +2778,7 @@
           <a:p>
             <a:fld id="{A10B2C42-6C94-4108-8FBA-C36D549E0CB5}" type="datetime1">
               <a:rPr lang="en-US" smtClean="0"/>
-              <a:t>4/10/2024</a:t>
+              <a:t>4/12/2024</a:t>
             </a:fld>
             <a:endParaRPr lang="en-US"/>
           </a:p>
@@ -2556,7 +2896,7 @@
           <a:p>
             <a:fld id="{3D1741E9-4398-4324-AD5E-DC41833D0D5A}" type="datetime1">
               <a:rPr lang="en-US" smtClean="0"/>
-              <a:t>4/10/2024</a:t>
+              <a:t>4/12/2024</a:t>
             </a:fld>
             <a:endParaRPr lang="en-US"/>
           </a:p>
@@ -2727,7 +3067,7 @@
           <a:p>
             <a:fld id="{3906D151-408D-43A7-A31F-E9DD593775C0}" type="datetime1">
               <a:rPr lang="en-US" smtClean="0"/>
-              <a:t>4/10/2024</a:t>
+              <a:t>4/12/2024</a:t>
             </a:fld>
             <a:endParaRPr lang="en-US"/>
           </a:p>
@@ -3086,7 +3426,7 @@
           <a:p>
             <a:fld id="{2944029E-EF4E-46DD-9822-5110C1513648}" type="datetime1">
               <a:rPr lang="en-US" smtClean="0"/>
-              <a:t>4/10/2024</a:t>
+              <a:t>4/12/2024</a:t>
             </a:fld>
             <a:endParaRPr lang="en-US"/>
           </a:p>
@@ -3468,7 +3808,7 @@
           <a:p>
             <a:fld id="{8B851C8C-296E-4771-B364-133D71B0C358}" type="datetime1">
               <a:rPr lang="en-US" smtClean="0"/>
-              <a:t>4/10/2024</a:t>
+              <a:t>4/12/2024</a:t>
             </a:fld>
             <a:endParaRPr lang="en-US"/>
           </a:p>
@@ -3755,7 +4095,7 @@
           <a:p>
             <a:fld id="{B57E3975-6AC8-465E-9EDA-6F683FCFB259}" type="datetime1">
               <a:rPr lang="en-US" smtClean="0"/>
-              <a:t>4/10/2024</a:t>
+              <a:t>4/12/2024</a:t>
             </a:fld>
             <a:endParaRPr lang="en-US"/>
           </a:p>
@@ -5217,7 +5557,7 @@
         </p:nvSpPr>
         <p:spPr>
           <a:xfrm>
-            <a:off x="431117" y="2077407"/>
+            <a:off x="356616" y="1836416"/>
             <a:ext cx="4027465" cy="3416320"/>
           </a:xfrm>
           <a:prstGeom prst="rect">
@@ -5326,8 +5666,8 @@
         </p:nvSpPr>
         <p:spPr>
           <a:xfrm>
-            <a:off x="4979790" y="2077407"/>
-            <a:ext cx="4027465" cy="3785652"/>
+            <a:off x="5166362" y="1836416"/>
+            <a:ext cx="4027465" cy="4524315"/>
           </a:xfrm>
           <a:prstGeom prst="rect">
             <a:avLst/>
@@ -5370,7 +5710,7 @@
                 <a:latin typeface="Arial" panose="020B0604020202020204" pitchFamily="34" charset="0"/>
                 <a:cs typeface="Arial" panose="020B0604020202020204" pitchFamily="34" charset="0"/>
               </a:rPr>
-              <a:t>Increase computational resources</a:t>
+              <a:t>Increase computational resources (ex. Cloud)</a:t>
             </a:r>
           </a:p>
           <a:p>
@@ -5383,7 +5723,7 @@
                 <a:latin typeface="Arial" panose="020B0604020202020204" pitchFamily="34" charset="0"/>
                 <a:cs typeface="Arial" panose="020B0604020202020204" pitchFamily="34" charset="0"/>
               </a:rPr>
-              <a:t>5-fold cross validation</a:t>
+              <a:t>Validate with standard but computationally intensive approach</a:t>
             </a:r>
           </a:p>
           <a:p>
@@ -5396,7 +5736,7 @@
                 <a:latin typeface="Arial" panose="020B0604020202020204" pitchFamily="34" charset="0"/>
                 <a:cs typeface="Arial" panose="020B0604020202020204" pitchFamily="34" charset="0"/>
               </a:rPr>
-              <a:t>Optimal model layering</a:t>
+              <a:t>Optimize model configuration</a:t>
             </a:r>
           </a:p>
           <a:p>
@@ -5409,19 +5749,8 @@
                 <a:latin typeface="Arial" panose="020B0604020202020204" pitchFamily="34" charset="0"/>
                 <a:cs typeface="Arial" panose="020B0604020202020204" pitchFamily="34" charset="0"/>
               </a:rPr>
-              <a:t>Expose more hyperparameters in </a:t>
-            </a:r>
-            <a:r>
-              <a:rPr lang="en-US" sz="2400" dirty="0" err="1">
-                <a:latin typeface="Arial" panose="020B0604020202020204" pitchFamily="34" charset="0"/>
-                <a:cs typeface="Arial" panose="020B0604020202020204" pitchFamily="34" charset="0"/>
-              </a:rPr>
-              <a:t>GridSearch</a:t>
-            </a:r>
-            <a:endParaRPr lang="en-US" sz="2400" dirty="0">
-              <a:latin typeface="Arial" panose="020B0604020202020204" pitchFamily="34" charset="0"/>
-              <a:cs typeface="Arial" panose="020B0604020202020204" pitchFamily="34" charset="0"/>
-            </a:endParaRPr>
+              <a:t>Expose more parameters for the model</a:t>
+            </a:r>
           </a:p>
         </p:txBody>
       </p:sp>
@@ -5439,7 +5768,7 @@
         </p:nvCxnSpPr>
         <p:spPr>
           <a:xfrm>
-            <a:off x="4293108" y="2322576"/>
+            <a:off x="4274820" y="2059119"/>
             <a:ext cx="640080" cy="0"/>
           </a:xfrm>
           <a:prstGeom prst="straightConnector1">
@@ -5467,6 +5796,45 @@
           </a:fontRef>
         </p:style>
       </p:cxnSp>
+      <p:sp>
+        <p:nvSpPr>
+          <p:cNvPr id="4" name="TextBox 3">
+            <a:extLst>
+              <a:ext uri="{FF2B5EF4-FFF2-40B4-BE49-F238E27FC236}">
+                <a16:creationId xmlns:a16="http://schemas.microsoft.com/office/drawing/2014/main" id="{73A11A22-A164-41B6-D726-B4070504D597}"/>
+              </a:ext>
+            </a:extLst>
+          </p:cNvPr>
+          <p:cNvSpPr txBox="1"/>
+          <p:nvPr/>
+        </p:nvSpPr>
+        <p:spPr>
+          <a:xfrm>
+            <a:off x="423721" y="5252736"/>
+            <a:ext cx="3621024" cy="923330"/>
+          </a:xfrm>
+          <a:prstGeom prst="rect">
+            <a:avLst/>
+          </a:prstGeom>
+          <a:noFill/>
+        </p:spPr>
+        <p:txBody>
+          <a:bodyPr wrap="square" rtlCol="0">
+            <a:spAutoFit/>
+          </a:bodyPr>
+          <a:lstStyle/>
+          <a:p>
+            <a:r>
+              <a:rPr lang="en-US" dirty="0">
+                <a:solidFill>
+                  <a:srgbClr val="FF0000"/>
+                </a:solidFill>
+              </a:rPr>
+              <a:t>*If the model metrics above were closer to 1, this would indicate a strong performing model</a:t>
+            </a:r>
+          </a:p>
+        </p:txBody>
+      </p:sp>
     </p:spTree>
     <p:extLst>
       <p:ext uri="{BB962C8B-B14F-4D97-AF65-F5344CB8AC3E}">
@@ -5724,7 +6092,7 @@
           <p:nvPr/>
         </p:nvPicPr>
         <p:blipFill>
-          <a:blip r:embed="rId2">
+          <a:blip r:embed="rId3">
             <a:extLst>
               <a:ext uri="{28A0092B-C50C-407E-A947-70E740481C1C}">
                 <a14:useLocalDpi xmlns:a14="http://schemas.microsoft.com/office/drawing/2010/main" val="0"/>
@@ -5758,7 +6126,7 @@
           <p:nvPr/>
         </p:nvPicPr>
         <p:blipFill>
-          <a:blip r:embed="rId3"/>
+          <a:blip r:embed="rId4"/>
           <a:srcRect/>
           <a:stretch>
             <a:fillRect/>
@@ -5788,7 +6156,7 @@
           <p:nvPr/>
         </p:nvPicPr>
         <p:blipFill>
-          <a:blip r:embed="rId4"/>
+          <a:blip r:embed="rId5"/>
           <a:srcRect/>
           <a:stretch>
             <a:fillRect/>
@@ -5818,7 +6186,7 @@
           <p:nvPr/>
         </p:nvPicPr>
         <p:blipFill>
-          <a:blip r:embed="rId5"/>
+          <a:blip r:embed="rId6"/>
           <a:srcRect/>
           <a:stretch>
             <a:fillRect/>
@@ -5890,7 +6258,44 @@
                 <a:latin typeface="Arial" panose="020B0604020202020204" pitchFamily="34" charset="0"/>
                 <a:cs typeface="Arial" panose="020B0604020202020204" pitchFamily="34" charset="0"/>
               </a:rPr>
-              <a:t>21 Unique Genre Classes Retrieved aside from ‘None’</a:t>
+              <a:t>21 Unique Genre Classes retrieved aside from ‘None’</a:t>
+            </a:r>
+          </a:p>
+        </p:txBody>
+      </p:sp>
+      <p:sp>
+        <p:nvSpPr>
+          <p:cNvPr id="5" name="Rectangle 4">
+            <a:extLst>
+              <a:ext uri="{FF2B5EF4-FFF2-40B4-BE49-F238E27FC236}">
+                <a16:creationId xmlns:a16="http://schemas.microsoft.com/office/drawing/2014/main" id="{BB63BAC3-3CFC-2C56-B80E-1E5E63514BAD}"/>
+              </a:ext>
+            </a:extLst>
+          </p:cNvPr>
+          <p:cNvSpPr/>
+          <p:nvPr/>
+        </p:nvSpPr>
+        <p:spPr>
+          <a:xfrm>
+            <a:off x="338328" y="5185651"/>
+            <a:ext cx="8741664" cy="830997"/>
+          </a:xfrm>
+          <a:prstGeom prst="rect">
+            <a:avLst/>
+          </a:prstGeom>
+        </p:spPr>
+        <p:txBody>
+          <a:bodyPr wrap="square">
+            <a:spAutoFit/>
+          </a:bodyPr>
+          <a:lstStyle/>
+          <a:p>
+            <a:r>
+              <a:rPr lang="en-US" sz="2400" dirty="0">
+                <a:latin typeface="Arial" panose="020B0604020202020204" pitchFamily="34" charset="0"/>
+                <a:cs typeface="Arial" panose="020B0604020202020204" pitchFamily="34" charset="0"/>
+              </a:rPr>
+              <a:t>Clear imbalance of genres with the current dataset, so the model has a hard time learning to predict the different genres!</a:t>
             </a:r>
           </a:p>
         </p:txBody>
@@ -6013,7 +6418,7 @@
           <p:nvPr/>
         </p:nvPicPr>
         <p:blipFill>
-          <a:blip r:embed="rId2">
+          <a:blip r:embed="rId3">
             <a:extLst>
               <a:ext uri="{28A0092B-C50C-407E-A947-70E740481C1C}">
                 <a14:useLocalDpi xmlns:a14="http://schemas.microsoft.com/office/drawing/2010/main" val="0"/>
@@ -6109,7 +6514,7 @@
           <p:nvPr/>
         </p:nvPicPr>
         <p:blipFill>
-          <a:blip r:embed="rId3"/>
+          <a:blip r:embed="rId4"/>
           <a:stretch>
             <a:fillRect/>
           </a:stretch>
@@ -6219,7 +6624,7 @@
           <p:nvPr/>
         </p:nvPicPr>
         <p:blipFill>
-          <a:blip r:embed="rId4"/>
+          <a:blip r:embed="rId5"/>
           <a:stretch>
             <a:fillRect/>
           </a:stretch>
@@ -6291,7 +6696,7 @@
         <p:spPr>
           <a:xfrm>
             <a:off x="6693409" y="5793607"/>
-            <a:ext cx="3054096" cy="307777"/>
+            <a:ext cx="2715767" cy="307777"/>
           </a:xfrm>
           <a:prstGeom prst="rect">
             <a:avLst/>
@@ -6306,11 +6711,218 @@
           <a:p>
             <a:r>
               <a:rPr lang="en-US" sz="1400" dirty="0"/>
-              <a:t>Classification of Genre Class(es)</a:t>
-            </a:r>
-          </a:p>
-        </p:txBody>
-      </p:sp>
+              <a:t>Classification of Genre Class(es):</a:t>
+            </a:r>
+          </a:p>
+        </p:txBody>
+      </p:sp>
+      <p:pic>
+        <p:nvPicPr>
+          <p:cNvPr id="5" name="Picture 4" descr="A dvd case with a person and a child and a dog&#10;&#10;Description automatically generated">
+            <a:extLst>
+              <a:ext uri="{FF2B5EF4-FFF2-40B4-BE49-F238E27FC236}">
+                <a16:creationId xmlns:a16="http://schemas.microsoft.com/office/drawing/2014/main" id="{C6333C2C-E275-B06F-429F-21F733A5EE39}"/>
+              </a:ext>
+            </a:extLst>
+          </p:cNvPr>
+          <p:cNvPicPr>
+            <a:picLocks noChangeAspect="1"/>
+          </p:cNvPicPr>
+          <p:nvPr/>
+        </p:nvPicPr>
+        <p:blipFill>
+          <a:blip r:embed="rId6">
+            <a:extLst>
+              <a:ext uri="{28A0092B-C50C-407E-A947-70E740481C1C}">
+                <a14:useLocalDpi xmlns:a14="http://schemas.microsoft.com/office/drawing/2010/main" val="0"/>
+              </a:ext>
+            </a:extLst>
+          </a:blip>
+          <a:stretch>
+            <a:fillRect/>
+          </a:stretch>
+        </p:blipFill>
+        <p:spPr>
+          <a:xfrm>
+            <a:off x="560943" y="2407951"/>
+            <a:ext cx="900727" cy="1225918"/>
+          </a:xfrm>
+          <a:prstGeom prst="rect">
+            <a:avLst/>
+          </a:prstGeom>
+        </p:spPr>
+      </p:pic>
+      <p:sp>
+        <p:nvSpPr>
+          <p:cNvPr id="7" name="TextBox 6">
+            <a:extLst>
+              <a:ext uri="{FF2B5EF4-FFF2-40B4-BE49-F238E27FC236}">
+                <a16:creationId xmlns:a16="http://schemas.microsoft.com/office/drawing/2014/main" id="{060CA5DB-974A-2A85-A6A0-E95367B9F708}"/>
+              </a:ext>
+            </a:extLst>
+          </p:cNvPr>
+          <p:cNvSpPr txBox="1"/>
+          <p:nvPr/>
+        </p:nvSpPr>
+        <p:spPr>
+          <a:xfrm>
+            <a:off x="6949441" y="6006210"/>
+            <a:ext cx="2581704" cy="307777"/>
+          </a:xfrm>
+          <a:prstGeom prst="rect">
+            <a:avLst/>
+          </a:prstGeom>
+          <a:noFill/>
+        </p:spPr>
+        <p:txBody>
+          <a:bodyPr wrap="square" rtlCol="0">
+            <a:spAutoFit/>
+          </a:bodyPr>
+          <a:lstStyle/>
+          <a:p>
+            <a:r>
+              <a:rPr lang="en-US" sz="1400" dirty="0">
+                <a:solidFill>
+                  <a:srgbClr val="FF0000"/>
+                </a:solidFill>
+              </a:rPr>
+              <a:t>Comedy, Crime, Drama</a:t>
+            </a:r>
+          </a:p>
+        </p:txBody>
+      </p:sp>
+      <p:sp>
+        <p:nvSpPr>
+          <p:cNvPr id="8" name="TextBox 7">
+            <a:extLst>
+              <a:ext uri="{FF2B5EF4-FFF2-40B4-BE49-F238E27FC236}">
+                <a16:creationId xmlns:a16="http://schemas.microsoft.com/office/drawing/2014/main" id="{9279578B-B66B-C9DD-6538-BB0BDD7DD8D6}"/>
+              </a:ext>
+            </a:extLst>
+          </p:cNvPr>
+          <p:cNvSpPr txBox="1"/>
+          <p:nvPr/>
+        </p:nvSpPr>
+        <p:spPr>
+          <a:xfrm>
+            <a:off x="170058" y="3933621"/>
+            <a:ext cx="1682496" cy="2031325"/>
+          </a:xfrm>
+          <a:prstGeom prst="rect">
+            <a:avLst/>
+          </a:prstGeom>
+          <a:noFill/>
+          <a:ln w="38100">
+            <a:solidFill>
+              <a:schemeClr val="tx1"/>
+            </a:solidFill>
+          </a:ln>
+        </p:spPr>
+        <p:txBody>
+          <a:bodyPr wrap="square" rtlCol="0">
+            <a:spAutoFit/>
+          </a:bodyPr>
+          <a:lstStyle/>
+          <a:p>
+            <a:r>
+              <a:rPr lang="en-US" sz="1400" dirty="0"/>
+              <a:t>Model learns the different features of the image after each convolutional layer and then </a:t>
+            </a:r>
+            <a:r>
+              <a:rPr lang="en-US" sz="1400" dirty="0" err="1"/>
+              <a:t>MaxPooling</a:t>
+            </a:r>
+            <a:r>
+              <a:rPr lang="en-US" sz="1400" dirty="0"/>
+              <a:t> retrieves the most important aspects of the image</a:t>
+            </a:r>
+          </a:p>
+        </p:txBody>
+      </p:sp>
+      <p:sp>
+        <p:nvSpPr>
+          <p:cNvPr id="9" name="TextBox 8">
+            <a:extLst>
+              <a:ext uri="{FF2B5EF4-FFF2-40B4-BE49-F238E27FC236}">
+                <a16:creationId xmlns:a16="http://schemas.microsoft.com/office/drawing/2014/main" id="{F9AB80F1-DB69-CAE1-9B97-349AE8D58818}"/>
+              </a:ext>
+            </a:extLst>
+          </p:cNvPr>
+          <p:cNvSpPr txBox="1"/>
+          <p:nvPr/>
+        </p:nvSpPr>
+        <p:spPr>
+          <a:xfrm>
+            <a:off x="6951081" y="2965265"/>
+            <a:ext cx="1854591" cy="2246769"/>
+          </a:xfrm>
+          <a:prstGeom prst="rect">
+            <a:avLst/>
+          </a:prstGeom>
+          <a:noFill/>
+          <a:ln w="38100">
+            <a:solidFill>
+              <a:schemeClr val="tx1"/>
+            </a:solidFill>
+          </a:ln>
+        </p:spPr>
+        <p:txBody>
+          <a:bodyPr wrap="square" rtlCol="0">
+            <a:spAutoFit/>
+          </a:bodyPr>
+          <a:lstStyle/>
+          <a:p>
+            <a:r>
+              <a:rPr lang="en-US" sz="1400" dirty="0"/>
+              <a:t>Image then is converted to a 1D array in where in the subsequent layers the model learns the features of this 1D array and then makes its prediction of genres of movies in output layer</a:t>
+            </a:r>
+          </a:p>
+        </p:txBody>
+      </p:sp>
+      <p:cxnSp>
+        <p:nvCxnSpPr>
+          <p:cNvPr id="4" name="Straight Arrow Connector 3">
+            <a:extLst>
+              <a:ext uri="{FF2B5EF4-FFF2-40B4-BE49-F238E27FC236}">
+                <a16:creationId xmlns:a16="http://schemas.microsoft.com/office/drawing/2014/main" id="{45BAF7AE-29FD-58E4-FFF6-E41E36241FF8}"/>
+              </a:ext>
+            </a:extLst>
+          </p:cNvPr>
+          <p:cNvCxnSpPr>
+            <a:cxnSpLocks/>
+          </p:cNvCxnSpPr>
+          <p:nvPr/>
+        </p:nvCxnSpPr>
+        <p:spPr>
+          <a:xfrm flipH="1">
+            <a:off x="6199633" y="3599538"/>
+            <a:ext cx="664466" cy="0"/>
+          </a:xfrm>
+          <a:prstGeom prst="straightConnector1">
+            <a:avLst/>
+          </a:prstGeom>
+          <a:ln w="38100">
+            <a:solidFill>
+              <a:schemeClr val="tx1"/>
+            </a:solidFill>
+            <a:tailEnd type="triangle"/>
+          </a:ln>
+        </p:spPr>
+        <p:style>
+          <a:lnRef idx="1">
+            <a:schemeClr val="accent1"/>
+          </a:lnRef>
+          <a:fillRef idx="0">
+            <a:schemeClr val="accent1"/>
+          </a:fillRef>
+          <a:effectRef idx="0">
+            <a:schemeClr val="accent1"/>
+          </a:effectRef>
+          <a:fontRef idx="minor">
+            <a:schemeClr val="tx1"/>
+          </a:fontRef>
+        </p:style>
+      </p:cxnSp>
     </p:spTree>
     <p:extLst>
       <p:ext uri="{BB962C8B-B14F-4D97-AF65-F5344CB8AC3E}">
@@ -6429,7 +7041,7 @@
           <p:nvPr/>
         </p:nvPicPr>
         <p:blipFill>
-          <a:blip r:embed="rId2">
+          <a:blip r:embed="rId3">
             <a:extLst>
               <a:ext uri="{28A0092B-C50C-407E-A947-70E740481C1C}">
                 <a14:useLocalDpi xmlns:a14="http://schemas.microsoft.com/office/drawing/2010/main" val="0"/>
@@ -6464,8 +7076,8 @@
         </p:nvSpPr>
         <p:spPr>
           <a:xfrm>
-            <a:off x="736558" y="1678204"/>
-            <a:ext cx="8163955" cy="1938992"/>
+            <a:off x="777240" y="1538859"/>
+            <a:ext cx="8407442" cy="2246769"/>
           </a:xfrm>
           <a:prstGeom prst="rect">
             <a:avLst/>
@@ -6492,7 +7104,7 @@
                 <a:latin typeface="Arial" panose="020B0604020202020204" pitchFamily="34" charset="0"/>
                 <a:cs typeface="Arial" panose="020B0604020202020204" pitchFamily="34" charset="0"/>
               </a:rPr>
-              <a:t>Image Classifier model trained with an 80/20 split and 3-fold Cross Validated for compiler and activation functions</a:t>
+              <a:t>80% of the data used for training, 20% used for testing</a:t>
             </a:r>
           </a:p>
           <a:p>
@@ -6505,21 +7117,7 @@
                 <a:latin typeface="Arial" panose="020B0604020202020204" pitchFamily="34" charset="0"/>
                 <a:cs typeface="Arial" panose="020B0604020202020204" pitchFamily="34" charset="0"/>
               </a:rPr>
-              <a:t>Best parameters SGD compiler and ‘</a:t>
-            </a:r>
-            <a:r>
-              <a:rPr lang="en-US" sz="2000" dirty="0" err="1">
-                <a:latin typeface="Arial" panose="020B0604020202020204" pitchFamily="34" charset="0"/>
-                <a:cs typeface="Arial" panose="020B0604020202020204" pitchFamily="34" charset="0"/>
-              </a:rPr>
-              <a:t>relu</a:t>
-            </a:r>
-            <a:r>
-              <a:rPr lang="en-US" sz="2000" dirty="0">
-                <a:latin typeface="Arial" panose="020B0604020202020204" pitchFamily="34" charset="0"/>
-                <a:cs typeface="Arial" panose="020B0604020202020204" pitchFamily="34" charset="0"/>
-              </a:rPr>
-              <a:t>’ activation function</a:t>
+              <a:t>Model validated with slightly less computationally intensive approach </a:t>
             </a:r>
           </a:p>
           <a:p>
@@ -6532,7 +7130,34 @@
                 <a:latin typeface="Arial" panose="020B0604020202020204" pitchFamily="34" charset="0"/>
                 <a:cs typeface="Arial" panose="020B0604020202020204" pitchFamily="34" charset="0"/>
               </a:rPr>
-              <a:t>Model performance assessed based on f1_score and best model performer ROC AUC values for different genres assessed.</a:t>
+              <a:t>Best parameters: SGD optimizer and ‘</a:t>
+            </a:r>
+            <a:r>
+              <a:rPr lang="en-US" sz="2000" dirty="0" err="1">
+                <a:latin typeface="Arial" panose="020B0604020202020204" pitchFamily="34" charset="0"/>
+                <a:cs typeface="Arial" panose="020B0604020202020204" pitchFamily="34" charset="0"/>
+              </a:rPr>
+              <a:t>relu</a:t>
+            </a:r>
+            <a:r>
+              <a:rPr lang="en-US" sz="2000" dirty="0">
+                <a:latin typeface="Arial" panose="020B0604020202020204" pitchFamily="34" charset="0"/>
+                <a:cs typeface="Arial" panose="020B0604020202020204" pitchFamily="34" charset="0"/>
+              </a:rPr>
+              <a:t>’ activation function</a:t>
+            </a:r>
+          </a:p>
+          <a:p>
+            <a:pPr marL="285750" indent="-285750">
+              <a:buFont typeface="Arial" panose="020B0604020202020204" pitchFamily="34" charset="0"/>
+              <a:buChar char="•"/>
+            </a:pPr>
+            <a:r>
+              <a:rPr lang="en-US" sz="2000" dirty="0">
+                <a:latin typeface="Arial" panose="020B0604020202020204" pitchFamily="34" charset="0"/>
+                <a:cs typeface="Arial" panose="020B0604020202020204" pitchFamily="34" charset="0"/>
+              </a:rPr>
+              <a:t>F1_Score indicates how well (from a scale of 0 to 1) the model is able to predict genres. ROC AUC tells how well is the model able to predict the different genres compared to just a 50/50 random guess.</a:t>
             </a:r>
           </a:p>
         </p:txBody>
@@ -6869,7 +7494,7 @@
           <p:nvPr/>
         </p:nvPicPr>
         <p:blipFill>
-          <a:blip r:embed="rId3"/>
+          <a:blip r:embed="rId4"/>
           <a:stretch>
             <a:fillRect/>
           </a:stretch>
@@ -7062,6 +7687,45 @@
               <a:latin typeface="Arial" panose="020B0604020202020204" pitchFamily="34" charset="0"/>
               <a:ea typeface="Arial" panose="020B0604020202020204" pitchFamily="34" charset="0"/>
             </a:endParaRPr>
+          </a:p>
+        </p:txBody>
+      </p:sp>
+      <p:sp>
+        <p:nvSpPr>
+          <p:cNvPr id="5" name="TextBox 4">
+            <a:extLst>
+              <a:ext uri="{FF2B5EF4-FFF2-40B4-BE49-F238E27FC236}">
+                <a16:creationId xmlns:a16="http://schemas.microsoft.com/office/drawing/2014/main" id="{1840E3D3-0A68-223B-618B-0B7B160A2782}"/>
+              </a:ext>
+            </a:extLst>
+          </p:cNvPr>
+          <p:cNvSpPr txBox="1"/>
+          <p:nvPr/>
+        </p:nvSpPr>
+        <p:spPr>
+          <a:xfrm>
+            <a:off x="3514929" y="4043313"/>
+            <a:ext cx="5034711" cy="646331"/>
+          </a:xfrm>
+          <a:prstGeom prst="rect">
+            <a:avLst/>
+          </a:prstGeom>
+          <a:noFill/>
+        </p:spPr>
+        <p:txBody>
+          <a:bodyPr wrap="square" rtlCol="0">
+            <a:spAutoFit/>
+          </a:bodyPr>
+          <a:lstStyle/>
+          <a:p>
+            <a:r>
+              <a:rPr lang="en-US" dirty="0">
+                <a:solidFill>
+                  <a:srgbClr val="FF0000"/>
+                </a:solidFill>
+              </a:rPr>
+              <a:t>*Again, if the below model metrics were closer to 1, this would indicate a strong performing model</a:t>
+            </a:r>
           </a:p>
         </p:txBody>
       </p:sp>
@@ -7221,7 +7885,7 @@
         <p:spPr>
           <a:xfrm>
             <a:off x="702620" y="1632484"/>
-            <a:ext cx="8163955" cy="3785652"/>
+            <a:ext cx="8163955" cy="4093428"/>
           </a:xfrm>
           <a:prstGeom prst="rect">
             <a:avLst/>
@@ -7280,7 +7944,7 @@
                 <a:latin typeface="Arial" panose="020B0604020202020204" pitchFamily="34" charset="0"/>
                 <a:cs typeface="Arial" panose="020B0604020202020204" pitchFamily="34" charset="0"/>
               </a:rPr>
-              <a:t>Imbalance of genres within initial dataset</a:t>
+              <a:t>Not enough different genre data for the model to learn</a:t>
             </a:r>
           </a:p>
           <a:p>
@@ -7293,7 +7957,7 @@
                 <a:latin typeface="Arial" panose="020B0604020202020204" pitchFamily="34" charset="0"/>
                 <a:cs typeface="Arial" panose="020B0604020202020204" pitchFamily="34" charset="0"/>
               </a:rPr>
-              <a:t>Number of layers or filters within the model might not be most optimal for generalizability of the model</a:t>
+              <a:t>Overall configuration (layers, filters) of the model needs fine tuning</a:t>
             </a:r>
           </a:p>
           <a:p>
@@ -7306,7 +7970,7 @@
                 <a:latin typeface="Arial" panose="020B0604020202020204" pitchFamily="34" charset="0"/>
                 <a:cs typeface="Arial" panose="020B0604020202020204" pitchFamily="34" charset="0"/>
               </a:rPr>
-              <a:t>3-fold cross validation not best method to generalize the model</a:t>
+              <a:t>Need to validate the model’s effectiveness with the standard but more computationally intensive approach</a:t>
             </a:r>
           </a:p>
           <a:p>
@@ -7319,21 +7983,7 @@
                 <a:latin typeface="Arial" panose="020B0604020202020204" pitchFamily="34" charset="0"/>
                 <a:cs typeface="Arial" panose="020B0604020202020204" pitchFamily="34" charset="0"/>
               </a:rPr>
-              <a:t>More hyperparameters will need to be tested within </a:t>
-            </a:r>
-            <a:r>
-              <a:rPr lang="en-US" sz="2000" dirty="0" err="1">
-                <a:latin typeface="Arial" panose="020B0604020202020204" pitchFamily="34" charset="0"/>
-                <a:cs typeface="Arial" panose="020B0604020202020204" pitchFamily="34" charset="0"/>
-              </a:rPr>
-              <a:t>GridSearchCV</a:t>
-            </a:r>
-            <a:r>
-              <a:rPr lang="en-US" sz="2000" dirty="0">
-                <a:latin typeface="Arial" panose="020B0604020202020204" pitchFamily="34" charset="0"/>
-                <a:cs typeface="Arial" panose="020B0604020202020204" pitchFamily="34" charset="0"/>
-              </a:rPr>
-              <a:t> (learning rate, activation functions, model compilers, etc.)</a:t>
+              <a:t>More parameters need to be tested to get best performing model (learning rate, activation functions, model optimizers, etc.)</a:t>
             </a:r>
           </a:p>
         </p:txBody>
@@ -7494,7 +8144,7 @@
         <p:spPr>
           <a:xfrm>
             <a:off x="512882" y="1737361"/>
-            <a:ext cx="8163955" cy="4093428"/>
+            <a:ext cx="8163955" cy="3477875"/>
           </a:xfrm>
           <a:prstGeom prst="rect">
             <a:avLst/>
@@ -7559,22 +8209,6 @@
                 <a:latin typeface="Arial" panose="020B0604020202020204"/>
               </a:rPr>
               <a:t>Include PG-13 movies and movies dating from 1980s to 2024</a:t>
-            </a:r>
-          </a:p>
-          <a:p>
-            <a:pPr marL="742950" lvl="1" indent="-285750">
-              <a:buFont typeface="Arial" panose="020B0604020202020204" pitchFamily="34" charset="0"/>
-              <a:buChar char="•"/>
-            </a:pPr>
-            <a:r>
-              <a:rPr lang="en-US" sz="2000" i="0" u="none" strike="noStrike" dirty="0">
-                <a:solidFill>
-                  <a:srgbClr val="000000"/>
-                </a:solidFill>
-                <a:effectLst/>
-                <a:latin typeface="Arial" panose="020B0604020202020204"/>
-              </a:rPr>
-              <a:t>Augment current movie poster images </a:t>
             </a:r>
           </a:p>
           <a:p>
@@ -7610,14 +8244,8 @@
                 <a:effectLst/>
                 <a:latin typeface="Arial" panose="020B0604020202020204"/>
               </a:rPr>
-              <a:t>computational resources</a:t>
-            </a:r>
-          </a:p>
-          <a:p>
-            <a:pPr marL="742950" lvl="1" indent="-285750">
-              <a:buFont typeface="Arial" panose="020B0604020202020204" pitchFamily="34" charset="0"/>
-              <a:buChar char="•"/>
-            </a:pPr>
+              <a:t>computational resources (ex. </a:t>
+            </a:r>
             <a:r>
               <a:rPr lang="en-US" sz="2000" dirty="0">
                 <a:solidFill>
@@ -7625,7 +8253,29 @@
                 </a:solidFill>
                 <a:latin typeface="Arial" panose="020B0604020202020204"/>
               </a:rPr>
-              <a:t>Perform 5-fold cross validation instead of 3-fold</a:t>
+              <a:t>Cloud computing)</a:t>
+            </a:r>
+            <a:endParaRPr lang="en-US" sz="2000" i="0" u="none" strike="noStrike" dirty="0">
+              <a:solidFill>
+                <a:srgbClr val="000000"/>
+              </a:solidFill>
+              <a:effectLst/>
+              <a:latin typeface="Arial" panose="020B0604020202020204"/>
+            </a:endParaRPr>
+          </a:p>
+          <a:p>
+            <a:pPr marL="742950" lvl="1" indent="-285750">
+              <a:buFont typeface="Arial" panose="020B0604020202020204" pitchFamily="34" charset="0"/>
+              <a:buChar char="•"/>
+            </a:pPr>
+            <a:r>
+              <a:rPr lang="en-US" sz="2000" dirty="0">
+                <a:solidFill>
+                  <a:srgbClr val="000000"/>
+                </a:solidFill>
+                <a:latin typeface="Arial" panose="020B0604020202020204"/>
+              </a:rPr>
+              <a:t>Perform the standard but more computationally intensive approach to validate the model</a:t>
             </a:r>
           </a:p>
           <a:p>
@@ -7641,17 +8291,14 @@
                 <a:effectLst/>
                 <a:latin typeface="Arial" panose="020B0604020202020204"/>
               </a:rPr>
-              <a:t>Optimize the convolutional and </a:t>
-            </a:r>
-            <a:r>
-              <a:rPr lang="en-US" sz="2000" dirty="0">
-                <a:solidFill>
-                  <a:srgbClr val="000000"/>
-                </a:solidFill>
-                <a:latin typeface="Arial" panose="020B0604020202020204"/>
-              </a:rPr>
-              <a:t>dense layers for appropriate filter numbers and kernel window</a:t>
-            </a:r>
+              <a:t>Optimize the overall configuration of the model</a:t>
+            </a:r>
+            <a:endParaRPr lang="en-US" sz="2000" dirty="0">
+              <a:solidFill>
+                <a:srgbClr val="000000"/>
+              </a:solidFill>
+              <a:latin typeface="Arial" panose="020B0604020202020204"/>
+            </a:endParaRPr>
           </a:p>
           <a:p>
             <a:pPr marL="742950" lvl="1" indent="-285750">
@@ -7666,17 +8313,16 @@
                 <a:effectLst/>
                 <a:latin typeface="Arial" panose="020B0604020202020204"/>
               </a:rPr>
-              <a:t>Expose current model’s </a:t>
-            </a:r>
-            <a:r>
-              <a:rPr lang="en-US" sz="2000" i="0" u="none" strike="noStrike" dirty="0" err="1">
+              <a:t>Expose current model to more </a:t>
+            </a:r>
+            <a:r>
+              <a:rPr lang="en-US" sz="2000" dirty="0">
                 <a:solidFill>
                   <a:srgbClr val="000000"/>
                 </a:solidFill>
-                <a:effectLst/>
                 <a:latin typeface="Arial" panose="020B0604020202020204"/>
               </a:rPr>
-              <a:t>GridSearchCV</a:t>
+              <a:t>parameters</a:t>
             </a:r>
             <a:r>
               <a:rPr lang="en-US" sz="2000" i="0" u="none" strike="noStrike" dirty="0">
@@ -7686,7 +8332,26 @@
                 <a:effectLst/>
                 <a:latin typeface="Arial" panose="020B0604020202020204"/>
               </a:rPr>
-              <a:t> to more hyperparameters (learning rate, activation functions, and model compilers)</a:t>
+              <a:t> (learning rate, activation functions, and model </a:t>
+            </a:r>
+            <a:r>
+              <a:rPr lang="en-US" sz="2000" dirty="0">
+                <a:solidFill>
+                  <a:srgbClr val="000000"/>
+                </a:solidFill>
+                <a:latin typeface="Arial" panose="020B0604020202020204"/>
+              </a:rPr>
+              <a:t>optimizers</a:t>
+            </a:r>
+            <a:r>
+              <a:rPr lang="en-US" sz="2000" i="0" u="none" strike="noStrike" dirty="0">
+                <a:solidFill>
+                  <a:srgbClr val="000000"/>
+                </a:solidFill>
+                <a:effectLst/>
+                <a:latin typeface="Arial" panose="020B0604020202020204"/>
+              </a:rPr>
+              <a:t>)</a:t>
             </a:r>
           </a:p>
           <a:p>
@@ -7947,28 +8612,6 @@
             </a:r>
           </a:p>
           <a:p>
-            <a:pPr marL="1200150" lvl="2" indent="-285750">
-              <a:buFont typeface="Arial" panose="020B0604020202020204" pitchFamily="34" charset="0"/>
-              <a:buChar char="•"/>
-            </a:pPr>
-            <a:r>
-              <a:rPr lang="en-US" sz="2000" b="0" i="0" u="none" strike="noStrike" dirty="0">
-                <a:solidFill>
-                  <a:srgbClr val="000000"/>
-                </a:solidFill>
-                <a:effectLst/>
-                <a:latin typeface="Arial" panose="020B0604020202020204" pitchFamily="34" charset="0"/>
-              </a:rPr>
-              <a:t>Augment current movie poster images</a:t>
-            </a:r>
-            <a:endParaRPr lang="en-US" sz="2000" dirty="0">
-              <a:solidFill>
-                <a:srgbClr val="000000"/>
-              </a:solidFill>
-              <a:latin typeface="Arial" panose="020B0604020202020204" pitchFamily="34" charset="0"/>
-            </a:endParaRPr>
-          </a:p>
-          <a:p>
             <a:pPr lvl="2"/>
             <a:endParaRPr lang="en-US" sz="2000" b="0" i="0" u="none" strike="noStrike" dirty="0">
               <a:solidFill>
@@ -7990,7 +8633,22 @@
                 </a:solidFill>
                 <a:latin typeface="Arial" panose="020B0604020202020204" pitchFamily="34" charset="0"/>
               </a:rPr>
-              <a:t>Increase computational resources</a:t>
+              <a:t>Increase computational resources (ex. Cloud computing)</a:t>
+            </a:r>
+          </a:p>
+          <a:p>
+            <a:pPr marL="1200150" lvl="2" indent="-285750">
+              <a:buFont typeface="Arial" panose="020B0604020202020204" pitchFamily="34" charset="0"/>
+              <a:buChar char="•"/>
+            </a:pPr>
+            <a:r>
+              <a:rPr lang="en-US" sz="2000" dirty="0">
+                <a:solidFill>
+                  <a:srgbClr val="000000"/>
+                </a:solidFill>
+                <a:latin typeface="Arial" panose="020B0604020202020204"/>
+              </a:rPr>
+              <a:t>Perform the standard but more computationally intensive approach to validate the model</a:t>
             </a:r>
           </a:p>
           <a:p>
@@ -8005,7 +8663,7 @@
                 </a:solidFill>
                 <a:latin typeface="Arial" panose="020B0604020202020204" pitchFamily="34" charset="0"/>
               </a:rPr>
-              <a:t>5-fold cross validation instead of 3-fold</a:t>
+              <a:t>Optimize overall model configuration</a:t>
             </a:r>
           </a:p>
           <a:p>
@@ -8020,40 +8678,7 @@
                 </a:solidFill>
                 <a:latin typeface="Arial" panose="020B0604020202020204" pitchFamily="34" charset="0"/>
               </a:rPr>
-              <a:t>Optimize different model layers</a:t>
-            </a:r>
-          </a:p>
-          <a:p>
-            <a:pPr marL="1200150" lvl="2" indent="-285750">
-              <a:buFont typeface="Arial" panose="020B0604020202020204" pitchFamily="34" charset="0"/>
-              <a:buChar char="•"/>
-            </a:pPr>
-            <a:r>
-              <a:rPr lang="en-US" sz="2000" dirty="0">
-                <a:solidFill>
-                  <a:srgbClr val="000000"/>
-                </a:solidFill>
-                <a:latin typeface="Arial" panose="020B0604020202020204" pitchFamily="34" charset="0"/>
-              </a:rPr>
-              <a:t>Expose current model to increased </a:t>
-            </a:r>
-            <a:r>
-              <a:rPr lang="en-US" sz="2000" dirty="0" err="1">
-                <a:solidFill>
-                  <a:srgbClr val="000000"/>
-                </a:solidFill>
-                <a:latin typeface="Arial" panose="020B0604020202020204" pitchFamily="34" charset="0"/>
-              </a:rPr>
-              <a:t>GridSearch</a:t>
-            </a:r>
-            <a:r>
-              <a:rPr lang="en-US" sz="2000" dirty="0">
-                <a:solidFill>
-                  <a:srgbClr val="000000"/>
-                </a:solidFill>
-                <a:latin typeface="Arial" panose="020B0604020202020204" pitchFamily="34" charset="0"/>
-              </a:rPr>
-              <a:t> parameters (learning rate, model compiler, activation functions, etc.)</a:t>
+              <a:t>Expose current model to increased parameters (learning rate, model optimizer, activation functions, etc.)</a:t>
             </a:r>
           </a:p>
           <a:p>

</xml_diff>

<commit_message>
Modified IMDb project to have f1_score micro as the metric and include War as a genre within the training set
</commit_message>
<xml_diff>
--- a/6_Documentation/IMDb_Classification_Presentation.pptx
+++ b/6_Documentation/IMDb_Classification_Presentation.pptx
@@ -206,7 +206,7 @@
           <a:p>
             <a:fld id="{AA74E6DA-C916-4BCE-A101-0DC09126B470}" type="datetimeFigureOut">
               <a:rPr lang="en-US" smtClean="0"/>
-              <a:t>4/12/2024</a:t>
+              <a:t>4/22/2024</a:t>
             </a:fld>
             <a:endParaRPr lang="en-US"/>
           </a:p>
@@ -1142,7 +1142,7 @@
           <a:p>
             <a:fld id="{4E9B4F57-B96C-436C-8E07-9ED15F333B94}" type="datetime1">
               <a:rPr lang="en-US" smtClean="0"/>
-              <a:t>4/12/2024</a:t>
+              <a:t>4/22/2024</a:t>
             </a:fld>
             <a:endParaRPr lang="en-US"/>
           </a:p>
@@ -1355,7 +1355,7 @@
           <a:p>
             <a:fld id="{E6CAFC69-17B8-49ED-8515-EEF742D798A3}" type="datetime1">
               <a:rPr lang="en-US" smtClean="0"/>
-              <a:t>4/12/2024</a:t>
+              <a:t>4/22/2024</a:t>
             </a:fld>
             <a:endParaRPr lang="en-US"/>
           </a:p>
@@ -1611,7 +1611,7 @@
           <a:p>
             <a:fld id="{49BD7017-5031-4A82-AAE7-53B05001D0CF}" type="datetime1">
               <a:rPr lang="en-US" smtClean="0"/>
-              <a:t>4/12/2024</a:t>
+              <a:t>4/22/2024</a:t>
             </a:fld>
             <a:endParaRPr lang="en-US"/>
           </a:p>
@@ -1781,7 +1781,7 @@
           <a:p>
             <a:fld id="{A9A38264-5CCD-493A-9147-46264A34D417}" type="datetime1">
               <a:rPr lang="en-US" smtClean="0"/>
-              <a:t>4/12/2024</a:t>
+              <a:t>4/22/2024</a:t>
             </a:fld>
             <a:endParaRPr lang="en-US"/>
           </a:p>
@@ -2124,7 +2124,7 @@
           <a:p>
             <a:fld id="{3F88EA74-F8A1-44F3-A943-871AE16A7C78}" type="datetime1">
               <a:rPr lang="en-US" smtClean="0"/>
-              <a:t>4/12/2024</a:t>
+              <a:t>4/22/2024</a:t>
             </a:fld>
             <a:endParaRPr lang="en-US"/>
           </a:p>
@@ -2399,7 +2399,7 @@
           <a:p>
             <a:fld id="{5EDD1233-B103-4F41-B1CD-BA0EAAAA00DE}" type="datetime1">
               <a:rPr lang="en-US" smtClean="0"/>
-              <a:t>4/12/2024</a:t>
+              <a:t>4/22/2024</a:t>
             </a:fld>
             <a:endParaRPr lang="en-US"/>
           </a:p>
@@ -2778,7 +2778,7 @@
           <a:p>
             <a:fld id="{A10B2C42-6C94-4108-8FBA-C36D549E0CB5}" type="datetime1">
               <a:rPr lang="en-US" smtClean="0"/>
-              <a:t>4/12/2024</a:t>
+              <a:t>4/22/2024</a:t>
             </a:fld>
             <a:endParaRPr lang="en-US"/>
           </a:p>
@@ -2896,7 +2896,7 @@
           <a:p>
             <a:fld id="{3D1741E9-4398-4324-AD5E-DC41833D0D5A}" type="datetime1">
               <a:rPr lang="en-US" smtClean="0"/>
-              <a:t>4/12/2024</a:t>
+              <a:t>4/22/2024</a:t>
             </a:fld>
             <a:endParaRPr lang="en-US"/>
           </a:p>
@@ -3067,7 +3067,7 @@
           <a:p>
             <a:fld id="{3906D151-408D-43A7-A31F-E9DD593775C0}" type="datetime1">
               <a:rPr lang="en-US" smtClean="0"/>
-              <a:t>4/12/2024</a:t>
+              <a:t>4/22/2024</a:t>
             </a:fld>
             <a:endParaRPr lang="en-US"/>
           </a:p>
@@ -3426,7 +3426,7 @@
           <a:p>
             <a:fld id="{2944029E-EF4E-46DD-9822-5110C1513648}" type="datetime1">
               <a:rPr lang="en-US" smtClean="0"/>
-              <a:t>4/12/2024</a:t>
+              <a:t>4/22/2024</a:t>
             </a:fld>
             <a:endParaRPr lang="en-US"/>
           </a:p>
@@ -3808,7 +3808,7 @@
           <a:p>
             <a:fld id="{8B851C8C-296E-4771-B364-133D71B0C358}" type="datetime1">
               <a:rPr lang="en-US" smtClean="0"/>
-              <a:t>4/12/2024</a:t>
+              <a:t>4/22/2024</a:t>
             </a:fld>
             <a:endParaRPr lang="en-US"/>
           </a:p>
@@ -4095,7 +4095,7 @@
           <a:p>
             <a:fld id="{B57E3975-6AC8-465E-9EDA-6F683FCFB259}" type="datetime1">
               <a:rPr lang="en-US" smtClean="0"/>
-              <a:t>4/12/2024</a:t>
+              <a:t>4/22/2024</a:t>
             </a:fld>
             <a:endParaRPr lang="en-US"/>
           </a:p>
@@ -5557,8 +5557,8 @@
         </p:nvSpPr>
         <p:spPr>
           <a:xfrm>
-            <a:off x="356616" y="1836416"/>
-            <a:ext cx="4027465" cy="3416320"/>
+            <a:off x="270215" y="1724217"/>
+            <a:ext cx="4027465" cy="3985706"/>
           </a:xfrm>
           <a:prstGeom prst="rect">
             <a:avLst/>
@@ -5571,14 +5571,14 @@
           <a:lstStyle/>
           <a:p>
             <a:r>
-              <a:rPr lang="en-US" sz="2400" dirty="0" err="1">
+              <a:rPr lang="en-US" sz="2300" dirty="0" err="1">
                 <a:latin typeface="Arial" panose="020B0604020202020204" pitchFamily="34" charset="0"/>
                 <a:cs typeface="Arial" panose="020B0604020202020204" pitchFamily="34" charset="0"/>
               </a:rPr>
               <a:t>Keras</a:t>
             </a:r>
             <a:r>
-              <a:rPr lang="en-US" sz="2400" dirty="0">
+              <a:rPr lang="en-US" sz="2300" dirty="0">
                 <a:latin typeface="Arial" panose="020B0604020202020204" pitchFamily="34" charset="0"/>
                 <a:cs typeface="Arial" panose="020B0604020202020204" pitchFamily="34" charset="0"/>
               </a:rPr>
@@ -5591,11 +5591,11 @@
               <a:buChar char="•"/>
             </a:pPr>
             <a:r>
-              <a:rPr lang="en-US" sz="2400" dirty="0">
+              <a:rPr lang="en-US" sz="2300" dirty="0">
                 <a:latin typeface="Arial" panose="020B0604020202020204" pitchFamily="34" charset="0"/>
                 <a:cs typeface="Arial" panose="020B0604020202020204" pitchFamily="34" charset="0"/>
               </a:rPr>
-              <a:t>F1 Score: 0.253</a:t>
+              <a:t>F1 Score Micro: 0.02</a:t>
             </a:r>
           </a:p>
           <a:p>
@@ -5604,11 +5604,11 @@
               <a:buChar char="•"/>
             </a:pPr>
             <a:r>
-              <a:rPr lang="en-US" sz="2400" dirty="0">
+              <a:rPr lang="en-US" sz="2300" dirty="0">
                 <a:latin typeface="Arial" panose="020B0604020202020204" pitchFamily="34" charset="0"/>
                 <a:cs typeface="Arial" panose="020B0604020202020204" pitchFamily="34" charset="0"/>
               </a:rPr>
-              <a:t>ROC AUC Comedy: 0.498</a:t>
+              <a:t>ROC AUC Adventure: 0.503</a:t>
             </a:r>
           </a:p>
           <a:p>
@@ -5617,11 +5617,11 @@
               <a:buChar char="•"/>
             </a:pPr>
             <a:r>
-              <a:rPr lang="en-US" sz="2400" dirty="0">
+              <a:rPr lang="en-US" sz="2300" dirty="0">
                 <a:latin typeface="Arial" panose="020B0604020202020204" pitchFamily="34" charset="0"/>
                 <a:cs typeface="Arial" panose="020B0604020202020204" pitchFamily="34" charset="0"/>
               </a:rPr>
-              <a:t>ROC AUC Adventure: 0.492</a:t>
+              <a:t>ROC AUC Action: 0.504</a:t>
             </a:r>
           </a:p>
           <a:p>
@@ -5630,11 +5630,11 @@
               <a:buChar char="•"/>
             </a:pPr>
             <a:r>
-              <a:rPr lang="en-US" sz="2400" dirty="0">
+              <a:rPr lang="en-US" sz="2300" dirty="0">
                 <a:latin typeface="Arial" panose="020B0604020202020204" pitchFamily="34" charset="0"/>
                 <a:cs typeface="Arial" panose="020B0604020202020204" pitchFamily="34" charset="0"/>
               </a:rPr>
-              <a:t>ROC AUC Drama: 0.493</a:t>
+              <a:t>ROC AUC Biography: 0.506</a:t>
             </a:r>
           </a:p>
           <a:p>
@@ -5643,11 +5643,24 @@
               <a:buChar char="•"/>
             </a:pPr>
             <a:r>
-              <a:rPr lang="en-US" sz="2400" dirty="0">
+              <a:rPr lang="en-US" sz="2300" dirty="0">
                 <a:latin typeface="Arial" panose="020B0604020202020204" pitchFamily="34" charset="0"/>
                 <a:cs typeface="Arial" panose="020B0604020202020204" pitchFamily="34" charset="0"/>
               </a:rPr>
-              <a:t>ROC AUC Documentary: 0.503</a:t>
+              <a:t>ROC AUC Comedy: 0.501</a:t>
+            </a:r>
+          </a:p>
+          <a:p>
+            <a:pPr marL="285750" indent="-285750">
+              <a:buFont typeface="Arial" panose="020B0604020202020204" pitchFamily="34" charset="0"/>
+              <a:buChar char="•"/>
+            </a:pPr>
+            <a:r>
+              <a:rPr lang="en-US" sz="2300" dirty="0">
+                <a:latin typeface="Arial" panose="020B0604020202020204" pitchFamily="34" charset="0"/>
+                <a:cs typeface="Arial" panose="020B0604020202020204" pitchFamily="34" charset="0"/>
+              </a:rPr>
+              <a:t>ROC AUC Documentary:0.504</a:t>
             </a:r>
           </a:p>
         </p:txBody>
@@ -5666,8 +5679,8 @@
         </p:nvSpPr>
         <p:spPr>
           <a:xfrm>
-            <a:off x="5166362" y="1836416"/>
-            <a:ext cx="4027465" cy="4524315"/>
+            <a:off x="4846322" y="1733489"/>
+            <a:ext cx="4489702" cy="4693593"/>
           </a:xfrm>
           <a:prstGeom prst="rect">
             <a:avLst/>
@@ -5680,7 +5693,7 @@
           <a:lstStyle/>
           <a:p>
             <a:r>
-              <a:rPr lang="en-US" sz="2400" dirty="0">
+              <a:rPr lang="en-US" sz="2300" dirty="0">
                 <a:latin typeface="Arial" panose="020B0604020202020204" pitchFamily="34" charset="0"/>
                 <a:cs typeface="Arial" panose="020B0604020202020204" pitchFamily="34" charset="0"/>
               </a:rPr>
@@ -5693,7 +5706,7 @@
               <a:buChar char="•"/>
             </a:pPr>
             <a:r>
-              <a:rPr lang="en-US" sz="2400" dirty="0">
+              <a:rPr lang="en-US" sz="2300" dirty="0">
                 <a:latin typeface="Arial" panose="020B0604020202020204" pitchFamily="34" charset="0"/>
                 <a:cs typeface="Arial" panose="020B0604020202020204" pitchFamily="34" charset="0"/>
               </a:rPr>
@@ -5706,7 +5719,7 @@
               <a:buChar char="•"/>
             </a:pPr>
             <a:r>
-              <a:rPr lang="en-US" sz="2400" dirty="0">
+              <a:rPr lang="en-US" sz="2300" dirty="0">
                 <a:latin typeface="Arial" panose="020B0604020202020204" pitchFamily="34" charset="0"/>
                 <a:cs typeface="Arial" panose="020B0604020202020204" pitchFamily="34" charset="0"/>
               </a:rPr>
@@ -5719,7 +5732,7 @@
               <a:buChar char="•"/>
             </a:pPr>
             <a:r>
-              <a:rPr lang="en-US" sz="2400" dirty="0">
+              <a:rPr lang="en-US" sz="2300" dirty="0">
                 <a:latin typeface="Arial" panose="020B0604020202020204" pitchFamily="34" charset="0"/>
                 <a:cs typeface="Arial" panose="020B0604020202020204" pitchFamily="34" charset="0"/>
               </a:rPr>
@@ -5732,7 +5745,7 @@
               <a:buChar char="•"/>
             </a:pPr>
             <a:r>
-              <a:rPr lang="en-US" sz="2400" dirty="0">
+              <a:rPr lang="en-US" sz="2300" dirty="0">
                 <a:latin typeface="Arial" panose="020B0604020202020204" pitchFamily="34" charset="0"/>
                 <a:cs typeface="Arial" panose="020B0604020202020204" pitchFamily="34" charset="0"/>
               </a:rPr>
@@ -5745,11 +5758,24 @@
               <a:buChar char="•"/>
             </a:pPr>
             <a:r>
-              <a:rPr lang="en-US" sz="2400" dirty="0">
+              <a:rPr lang="en-US" sz="2300" dirty="0">
                 <a:latin typeface="Arial" panose="020B0604020202020204" pitchFamily="34" charset="0"/>
                 <a:cs typeface="Arial" panose="020B0604020202020204" pitchFamily="34" charset="0"/>
               </a:rPr>
               <a:t>Expose more parameters for the model</a:t>
+            </a:r>
+          </a:p>
+          <a:p>
+            <a:pPr marL="742950" lvl="1" indent="-285750">
+              <a:buFont typeface="Arial" panose="020B0604020202020204" pitchFamily="34" charset="0"/>
+              <a:buChar char="•"/>
+            </a:pPr>
+            <a:r>
+              <a:rPr lang="en-US" sz="2300" dirty="0">
+                <a:latin typeface="Arial" panose="020B0604020202020204" pitchFamily="34" charset="0"/>
+                <a:cs typeface="Arial" panose="020B0604020202020204" pitchFamily="34" charset="0"/>
+              </a:rPr>
+              <a:t>Test other predictive models </a:t>
             </a:r>
           </a:p>
         </p:txBody>
@@ -5768,7 +5794,7 @@
         </p:nvCxnSpPr>
         <p:spPr>
           <a:xfrm>
-            <a:off x="4274820" y="2059119"/>
+            <a:off x="4041648" y="1949391"/>
             <a:ext cx="640080" cy="0"/>
           </a:xfrm>
           <a:prstGeom prst="straightConnector1">
@@ -5810,8 +5836,8 @@
         </p:nvSpPr>
         <p:spPr>
           <a:xfrm>
-            <a:off x="423721" y="5252736"/>
-            <a:ext cx="3621024" cy="923330"/>
+            <a:off x="270215" y="5598787"/>
+            <a:ext cx="5053535" cy="646331"/>
           </a:xfrm>
           <a:prstGeom prst="rect">
             <a:avLst/>
@@ -7157,7 +7183,7 @@
                 <a:latin typeface="Arial" panose="020B0604020202020204" pitchFamily="34" charset="0"/>
                 <a:cs typeface="Arial" panose="020B0604020202020204" pitchFamily="34" charset="0"/>
               </a:rPr>
-              <a:t>F1_Score indicates how well (from a scale of 0 to 1) the model is able to predict genres. ROC AUC tells how well is the model able to predict the different genres compared to just a 50/50 random guess.</a:t>
+              <a:t>F1_Score micro indicates how well (from a scale of 0 to 1) the model is able to predict genres. ROC AUC tells how well is the model able to predict the different genres compared to just a 50/50 random guess.</a:t>
             </a:r>
           </a:p>
         </p:txBody>
@@ -7239,14 +7265,14 @@
           <p:nvPr>
             <p:extLst>
               <p:ext uri="{D42A27DB-BD31-4B8C-83A1-F6EECF244321}">
-                <p14:modId xmlns:p14="http://schemas.microsoft.com/office/powerpoint/2010/main" val="1421573628"/>
+                <p14:modId xmlns:p14="http://schemas.microsoft.com/office/powerpoint/2010/main" val="2226495414"/>
               </p:ext>
             </p:extLst>
           </p:nvPr>
         </p:nvGraphicFramePr>
         <p:xfrm>
           <a:off x="736558" y="4816903"/>
-          <a:ext cx="7584009" cy="1118574"/>
+          <a:ext cx="7584008" cy="1118574"/>
         </p:xfrm>
         <a:graphic>
           <a:graphicData uri="http://schemas.openxmlformats.org/drawingml/2006/table">
@@ -7255,45 +7281,52 @@
                 <a:tableStyleId>{793D81CF-94F2-401A-BA57-92F5A7B2D0C5}</a:tableStyleId>
               </a:tblPr>
               <a:tblGrid>
-                <a:gridCol w="1641992">
+                <a:gridCol w="1337262">
                   <a:extLst>
                     <a:ext uri="{9D8B030D-6E8A-4147-A177-3AD203B41FA5}">
                       <a16:colId xmlns:a16="http://schemas.microsoft.com/office/drawing/2014/main" val="1355964385"/>
                     </a:ext>
                   </a:extLst>
                 </a:gridCol>
-                <a:gridCol w="1064644">
+                <a:gridCol w="867061">
                   <a:extLst>
                     <a:ext uri="{9D8B030D-6E8A-4147-A177-3AD203B41FA5}">
                       <a16:colId xmlns:a16="http://schemas.microsoft.com/office/drawing/2014/main" val="4027048071"/>
                     </a:ext>
                   </a:extLst>
                 </a:gridCol>
-                <a:gridCol w="954598">
+                <a:gridCol w="917887">
                   <a:extLst>
                     <a:ext uri="{9D8B030D-6E8A-4147-A177-3AD203B41FA5}">
                       <a16:colId xmlns:a16="http://schemas.microsoft.com/office/drawing/2014/main" val="2493907391"/>
                     </a:ext>
                   </a:extLst>
                 </a:gridCol>
-                <a:gridCol w="896112">
+                <a:gridCol w="804672">
                   <a:extLst>
                     <a:ext uri="{9D8B030D-6E8A-4147-A177-3AD203B41FA5}">
                       <a16:colId xmlns:a16="http://schemas.microsoft.com/office/drawing/2014/main" val="3581506953"/>
                     </a:ext>
                   </a:extLst>
                 </a:gridCol>
-                <a:gridCol w="1298448">
+                <a:gridCol w="914400">
                   <a:extLst>
                     <a:ext uri="{9D8B030D-6E8A-4147-A177-3AD203B41FA5}">
                       <a16:colId xmlns:a16="http://schemas.microsoft.com/office/drawing/2014/main" val="304333323"/>
                     </a:ext>
                   </a:extLst>
                 </a:gridCol>
-                <a:gridCol w="1728215">
+                <a:gridCol w="914400">
                   <a:extLst>
                     <a:ext uri="{9D8B030D-6E8A-4147-A177-3AD203B41FA5}">
                       <a16:colId xmlns:a16="http://schemas.microsoft.com/office/drawing/2014/main" val="3476909723"/>
+                    </a:ext>
+                  </a:extLst>
+                </a:gridCol>
+                <a:gridCol w="1828326">
+                  <a:extLst>
+                    <a:ext uri="{9D8B030D-6E8A-4147-A177-3AD203B41FA5}">
+                      <a16:colId xmlns:a16="http://schemas.microsoft.com/office/drawing/2014/main" val="3514186411"/>
                     </a:ext>
                   </a:extLst>
                 </a:gridCol>
@@ -7319,22 +7352,8 @@
                     <a:p>
                       <a:r>
                         <a:rPr lang="en-US" sz="1200" dirty="0"/>
-                        <a:t>F1_Score</a:t>
+                        <a:t>F1_Score Micro</a:t>
                       </a:r>
-                    </a:p>
-                  </a:txBody>
-                  <a:tcPr anchor="ctr"/>
-                </a:tc>
-                <a:tc>
-                  <a:txBody>
-                    <a:bodyPr/>
-                    <a:lstStyle/>
-                    <a:p>
-                      <a:r>
-                        <a:rPr lang="en-US" sz="1200" dirty="0" err="1"/>
-                        <a:t>ROC_AUC_Comedy</a:t>
-                      </a:r>
-                      <a:endParaRPr lang="en-US" sz="1200" dirty="0"/>
                     </a:p>
                   </a:txBody>
                   <a:tcPr anchor="ctr"/>
@@ -7360,7 +7379,21 @@
                     <a:p>
                       <a:r>
                         <a:rPr lang="en-US" sz="1200" dirty="0" err="1"/>
-                        <a:t>ROC_AUC_Drama</a:t>
+                        <a:t>ROC_AUC_Action</a:t>
+                      </a:r>
+                      <a:endParaRPr lang="en-US" sz="1200" dirty="0"/>
+                    </a:p>
+                  </a:txBody>
+                  <a:tcPr anchor="ctr"/>
+                </a:tc>
+                <a:tc>
+                  <a:txBody>
+                    <a:bodyPr/>
+                    <a:lstStyle/>
+                    <a:p>
+                      <a:r>
+                        <a:rPr lang="en-US" sz="1200" dirty="0" err="1"/>
+                        <a:t>ROC_AUC_Biography</a:t>
                       </a:r>
                       <a:endParaRPr lang="en-US" sz="1200" dirty="0"/>
                     </a:p>
@@ -7374,8 +7407,22 @@
                     <a:p>
                       <a:r>
                         <a:rPr lang="en-US" sz="1200" dirty="0"/>
-                        <a:t>ROC_AUC_ Documentary</a:t>
+                        <a:t>ROC_AUC_ Comedy</a:t>
                       </a:r>
+                    </a:p>
+                  </a:txBody>
+                  <a:tcPr anchor="ctr"/>
+                </a:tc>
+                <a:tc>
+                  <a:txBody>
+                    <a:bodyPr/>
+                    <a:lstStyle/>
+                    <a:p>
+                      <a:r>
+                        <a:rPr lang="en-US" sz="1200" dirty="0" err="1"/>
+                        <a:t>ROC_AUC_Documentary</a:t>
+                      </a:r>
+                      <a:endParaRPr lang="en-US" sz="1200" dirty="0"/>
                     </a:p>
                   </a:txBody>
                   <a:tcPr anchor="ctr"/>
@@ -7411,7 +7458,7 @@
                     <a:p>
                       <a:r>
                         <a:rPr lang="en-US" sz="1050" dirty="0"/>
-                        <a:t>0.25258895</a:t>
+                        <a:t>0.0186766</a:t>
                       </a:r>
                     </a:p>
                   </a:txBody>
@@ -7424,7 +7471,7 @@
                     <a:p>
                       <a:r>
                         <a:rPr lang="en-US" sz="1050" dirty="0"/>
-                        <a:t>0.4978308</a:t>
+                        <a:t>0.5028001</a:t>
                       </a:r>
                     </a:p>
                   </a:txBody>
@@ -7437,7 +7484,7 @@
                     <a:p>
                       <a:r>
                         <a:rPr lang="en-US" sz="1050" dirty="0"/>
-                        <a:t>0.49173069</a:t>
+                        <a:t>0.5041314</a:t>
                       </a:r>
                     </a:p>
                   </a:txBody>
@@ -7450,7 +7497,7 @@
                     <a:p>
                       <a:r>
                         <a:rPr lang="en-US" sz="1050" dirty="0"/>
-                        <a:t>0.49308443</a:t>
+                        <a:t>0.5062588</a:t>
                       </a:r>
                     </a:p>
                   </a:txBody>
@@ -7463,7 +7510,20 @@
                     <a:p>
                       <a:r>
                         <a:rPr lang="en-US" sz="1050" dirty="0"/>
-                        <a:t>0.503067484</a:t>
+                        <a:t>0.5012803</a:t>
+                      </a:r>
+                    </a:p>
+                  </a:txBody>
+                  <a:tcPr anchor="ctr"/>
+                </a:tc>
+                <a:tc>
+                  <a:txBody>
+                    <a:bodyPr/>
+                    <a:lstStyle/>
+                    <a:p>
+                      <a:r>
+                        <a:rPr lang="en-US" sz="1050" dirty="0"/>
+                        <a:t>0.5037350</a:t>
                       </a:r>
                     </a:p>
                   </a:txBody>
@@ -8144,7 +8204,7 @@
         <p:spPr>
           <a:xfrm>
             <a:off x="512882" y="1737361"/>
-            <a:ext cx="8163955" cy="3477875"/>
+            <a:ext cx="8163955" cy="4093428"/>
           </a:xfrm>
           <a:prstGeom prst="rect">
             <a:avLst/>
@@ -8353,6 +8413,63 @@
               </a:rPr>
               <a:t>)</a:t>
             </a:r>
+            <a:endParaRPr lang="en-US" sz="2000" dirty="0">
+              <a:solidFill>
+                <a:srgbClr val="000000"/>
+              </a:solidFill>
+              <a:latin typeface="Arial" panose="020B0604020202020204"/>
+            </a:endParaRPr>
+          </a:p>
+          <a:p>
+            <a:pPr lvl="1"/>
+            <a:endParaRPr lang="en-US" sz="2000" dirty="0">
+              <a:solidFill>
+                <a:srgbClr val="000000"/>
+              </a:solidFill>
+              <a:latin typeface="Arial" panose="020B0604020202020204"/>
+            </a:endParaRPr>
+          </a:p>
+          <a:p>
+            <a:pPr marL="285750" indent="-285750">
+              <a:buFont typeface="Arial" panose="020B0604020202020204" pitchFamily="34" charset="0"/>
+              <a:buChar char="•"/>
+            </a:pPr>
+            <a:r>
+              <a:rPr lang="en-US" sz="2000" b="1" i="0" u="none" strike="noStrike" dirty="0">
+                <a:solidFill>
+                  <a:srgbClr val="000000"/>
+                </a:solidFill>
+                <a:effectLst/>
+                <a:latin typeface="Arial" panose="020B0604020202020204"/>
+              </a:rPr>
+              <a:t>Develop and Test </a:t>
+            </a:r>
+            <a:r>
+              <a:rPr lang="en-US" sz="2000" i="0" u="none" strike="noStrike" dirty="0">
+                <a:solidFill>
+                  <a:srgbClr val="000000"/>
+                </a:solidFill>
+                <a:effectLst/>
+                <a:latin typeface="Arial" panose="020B0604020202020204"/>
+              </a:rPr>
+              <a:t>other predictive model</a:t>
+            </a:r>
+            <a:r>
+              <a:rPr lang="en-US" sz="2000" dirty="0">
+                <a:solidFill>
+                  <a:srgbClr val="000000"/>
+                </a:solidFill>
+                <a:latin typeface="Arial" panose="020B0604020202020204"/>
+              </a:rPr>
+              <a:t>s based on IMDb dataset</a:t>
+            </a:r>
+            <a:endParaRPr lang="en-US" sz="2000" i="0" u="none" strike="noStrike" dirty="0">
+              <a:solidFill>
+                <a:srgbClr val="000000"/>
+              </a:solidFill>
+              <a:effectLst/>
+              <a:latin typeface="Arial" panose="020B0604020202020204"/>
+            </a:endParaRPr>
           </a:p>
           <a:p>
             <a:endParaRPr lang="en-US" sz="2000" dirty="0">
@@ -8487,8 +8604,8 @@
         </p:nvSpPr>
         <p:spPr>
           <a:xfrm>
-            <a:off x="599498" y="1493083"/>
-            <a:ext cx="8163955" cy="5078313"/>
+            <a:off x="599498" y="1474795"/>
+            <a:ext cx="8163955" cy="5216813"/>
           </a:xfrm>
           <a:prstGeom prst="rect">
             <a:avLst/>
@@ -8500,7 +8617,7 @@
           </a:bodyPr>
           <a:lstStyle/>
           <a:p>
-            <a:endParaRPr lang="en-US" sz="2400" dirty="0">
+            <a:endParaRPr lang="en-US" sz="1850" dirty="0">
               <a:latin typeface="Arial" panose="020B0604020202020204" pitchFamily="34" charset="0"/>
               <a:cs typeface="Arial" panose="020B0604020202020204" pitchFamily="34" charset="0"/>
             </a:endParaRPr>
@@ -8511,7 +8628,7 @@
               <a:buChar char="•"/>
             </a:pPr>
             <a:r>
-              <a:rPr lang="en-US" sz="2000" dirty="0">
+              <a:rPr lang="en-US" sz="1850" dirty="0">
                 <a:effectLst/>
                 <a:latin typeface="Arial" panose="020B0604020202020204" pitchFamily="34" charset="0"/>
                 <a:ea typeface="Arial" panose="020B0604020202020204" pitchFamily="34" charset="0"/>
@@ -8519,14 +8636,14 @@
               <a:t>Current </a:t>
             </a:r>
             <a:r>
-              <a:rPr lang="en-US" sz="2000" dirty="0" err="1">
+              <a:rPr lang="en-US" sz="1850" dirty="0" err="1">
                 <a:latin typeface="Arial" panose="020B0604020202020204" pitchFamily="34" charset="0"/>
                 <a:ea typeface="Arial" panose="020B0604020202020204" pitchFamily="34" charset="0"/>
               </a:rPr>
               <a:t>Keras</a:t>
             </a:r>
             <a:r>
-              <a:rPr lang="en-US" sz="2000" dirty="0">
+              <a:rPr lang="en-US" sz="1850" dirty="0">
                 <a:latin typeface="Arial" panose="020B0604020202020204" pitchFamily="34" charset="0"/>
                 <a:ea typeface="Arial" panose="020B0604020202020204" pitchFamily="34" charset="0"/>
               </a:rPr>
@@ -8534,7 +8651,7 @@
             </a:r>
           </a:p>
           <a:p>
-            <a:endParaRPr lang="en-US" sz="2000" dirty="0">
+            <a:endParaRPr lang="en-US" sz="1850" dirty="0">
               <a:effectLst/>
               <a:latin typeface="Arial" panose="020B0604020202020204" pitchFamily="34" charset="0"/>
               <a:ea typeface="Arial" panose="020B0604020202020204" pitchFamily="34" charset="0"/>
@@ -8546,7 +8663,7 @@
               <a:buChar char="•"/>
             </a:pPr>
             <a:r>
-              <a:rPr lang="en-US" sz="2000" dirty="0">
+              <a:rPr lang="en-US" sz="1850" dirty="0">
                 <a:effectLst/>
                 <a:latin typeface="Arial" panose="020B0604020202020204" pitchFamily="34" charset="0"/>
                 <a:ea typeface="Arial" panose="020B0604020202020204" pitchFamily="34" charset="0"/>
@@ -8554,14 +8671,14 @@
               <a:t>Suggested i</a:t>
             </a:r>
             <a:r>
-              <a:rPr lang="en-US" sz="2000" dirty="0">
+              <a:rPr lang="en-US" sz="1850" dirty="0">
                 <a:latin typeface="Arial" panose="020B0604020202020204" pitchFamily="34" charset="0"/>
                 <a:ea typeface="Arial" panose="020B0604020202020204" pitchFamily="34" charset="0"/>
               </a:rPr>
               <a:t>mprovements</a:t>
             </a:r>
             <a:r>
-              <a:rPr lang="en-US" sz="2000" dirty="0">
+              <a:rPr lang="en-US" sz="1850" dirty="0">
                 <a:effectLst/>
                 <a:latin typeface="Arial" panose="020B0604020202020204" pitchFamily="34" charset="0"/>
                 <a:ea typeface="Arial" panose="020B0604020202020204" pitchFamily="34" charset="0"/>
@@ -8574,7 +8691,7 @@
               <a:buFont typeface="Arial" panose="020B0604020202020204" pitchFamily="34" charset="0"/>
               <a:buChar char="•"/>
             </a:pPr>
-            <a:endParaRPr lang="en-US" sz="2000" dirty="0">
+            <a:endParaRPr lang="en-US" sz="1850" dirty="0">
               <a:effectLst/>
               <a:latin typeface="Arial" panose="020B0604020202020204" pitchFamily="34" charset="0"/>
               <a:ea typeface="Arial" panose="020B0604020202020204" pitchFamily="34" charset="0"/>
@@ -8586,7 +8703,7 @@
               <a:buChar char="•"/>
             </a:pPr>
             <a:r>
-              <a:rPr lang="en-US" sz="2000" b="0" i="0" u="none" strike="noStrike" dirty="0">
+              <a:rPr lang="en-US" sz="1850" b="0" i="0" u="none" strike="noStrike" dirty="0">
                 <a:solidFill>
                   <a:srgbClr val="000000"/>
                 </a:solidFill>
@@ -8602,7 +8719,7 @@
               <a:buChar char="•"/>
             </a:pPr>
             <a:r>
-              <a:rPr lang="en-US" sz="2000" dirty="0">
+              <a:rPr lang="en-US" sz="1850" dirty="0">
                 <a:solidFill>
                   <a:srgbClr val="000000"/>
                 </a:solidFill>
@@ -8613,7 +8730,7 @@
           </a:p>
           <a:p>
             <a:pPr lvl="2"/>
-            <a:endParaRPr lang="en-US" sz="2000" b="0" i="0" u="none" strike="noStrike" dirty="0">
+            <a:endParaRPr lang="en-US" sz="1850" b="0" i="0" u="none" strike="noStrike" dirty="0">
               <a:solidFill>
                 <a:srgbClr val="000000"/>
               </a:solidFill>
@@ -8627,7 +8744,7 @@
               <a:buChar char="•"/>
             </a:pPr>
             <a:r>
-              <a:rPr lang="en-US" sz="2000" dirty="0">
+              <a:rPr lang="en-US" sz="1850" dirty="0">
                 <a:solidFill>
                   <a:srgbClr val="000000"/>
                 </a:solidFill>
@@ -8642,7 +8759,7 @@
               <a:buChar char="•"/>
             </a:pPr>
             <a:r>
-              <a:rPr lang="en-US" sz="2000" dirty="0">
+              <a:rPr lang="en-US" sz="1850" dirty="0">
                 <a:solidFill>
                   <a:srgbClr val="000000"/>
                 </a:solidFill>
@@ -8657,7 +8774,7 @@
               <a:buChar char="•"/>
             </a:pPr>
             <a:r>
-              <a:rPr lang="en-US" sz="2000" dirty="0">
+              <a:rPr lang="en-US" sz="1850" dirty="0">
                 <a:solidFill>
                   <a:srgbClr val="000000"/>
                 </a:solidFill>
@@ -8672,7 +8789,7 @@
               <a:buChar char="•"/>
             </a:pPr>
             <a:r>
-              <a:rPr lang="en-US" sz="2000" dirty="0">
+              <a:rPr lang="en-US" sz="1850" dirty="0">
                 <a:solidFill>
                   <a:srgbClr val="000000"/>
                 </a:solidFill>
@@ -8683,7 +8800,31 @@
           </a:p>
           <a:p>
             <a:pPr lvl="2"/>
-            <a:endParaRPr lang="en-US" sz="2000" b="0" i="0" u="none" strike="noStrike" dirty="0">
+            <a:endParaRPr lang="en-US" sz="1850" dirty="0">
+              <a:solidFill>
+                <a:srgbClr val="000000"/>
+              </a:solidFill>
+              <a:latin typeface="Arial" panose="020B0604020202020204" pitchFamily="34" charset="0"/>
+            </a:endParaRPr>
+          </a:p>
+          <a:p>
+            <a:pPr marL="742950" lvl="1" indent="-285750">
+              <a:buFont typeface="Arial" panose="020B0604020202020204" pitchFamily="34" charset="0"/>
+              <a:buChar char="•"/>
+            </a:pPr>
+            <a:r>
+              <a:rPr lang="en-US" sz="1850" dirty="0">
+                <a:solidFill>
+                  <a:srgbClr val="000000"/>
+                </a:solidFill>
+                <a:latin typeface="Arial" panose="020B0604020202020204" pitchFamily="34" charset="0"/>
+              </a:rPr>
+              <a:t>Develop and Test other predictive models based on IMDb dataset</a:t>
+            </a:r>
+          </a:p>
+          <a:p>
+            <a:pPr lvl="2"/>
+            <a:endParaRPr lang="en-US" sz="1850" b="0" i="0" u="none" strike="noStrike" dirty="0">
               <a:solidFill>
                 <a:srgbClr val="000000"/>
               </a:solidFill>

</xml_diff>